<commit_message>
Latest version of summary
</commit_message>
<xml_diff>
--- a/summary.pptx
+++ b/summary.pptx
@@ -141,7 +141,7 @@
   <pc:docChgLst>
     <pc:chgData name="Oscar Zamora Picazo" userId="4354f4aa-d855-4c88-ab21-c4609db47b84" providerId="ADAL" clId="{FB364DB0-0103-4D2F-BFDA-4DCB6883C9A8}"/>
     <pc:docChg chg="undo custSel addSld delSld modSld">
-      <pc:chgData name="Oscar Zamora Picazo" userId="4354f4aa-d855-4c88-ab21-c4609db47b84" providerId="ADAL" clId="{FB364DB0-0103-4D2F-BFDA-4DCB6883C9A8}" dt="2025-10-02T13:21:24.438" v="1070" actId="20577"/>
+      <pc:chgData name="Oscar Zamora Picazo" userId="4354f4aa-d855-4c88-ab21-c4609db47b84" providerId="ADAL" clId="{FB364DB0-0103-4D2F-BFDA-4DCB6883C9A8}" dt="2025-10-02T14:35:36.458" v="1077" actId="1076"/>
       <pc:docMkLst>
         <pc:docMk/>
       </pc:docMkLst>
@@ -879,7 +879,7 @@
         </pc:spChg>
       </pc:sldChg>
       <pc:sldChg chg="addSp delSp modSp add mod setBg">
-        <pc:chgData name="Oscar Zamora Picazo" userId="4354f4aa-d855-4c88-ab21-c4609db47b84" providerId="ADAL" clId="{FB364DB0-0103-4D2F-BFDA-4DCB6883C9A8}" dt="2025-10-02T13:04:06.343" v="940" actId="1076"/>
+        <pc:chgData name="Oscar Zamora Picazo" userId="4354f4aa-d855-4c88-ab21-c4609db47b84" providerId="ADAL" clId="{FB364DB0-0103-4D2F-BFDA-4DCB6883C9A8}" dt="2025-10-02T14:35:36.458" v="1077" actId="1076"/>
         <pc:sldMkLst>
           <pc:docMk/>
           <pc:sldMk cId="3438522871" sldId="267"/>
@@ -940,12 +940,20 @@
             <ac:spMk id="22" creationId="{53E5B1A8-3AC9-4BD1-9BBC-78CA94F2D1BA}"/>
           </ac:spMkLst>
         </pc:spChg>
-        <pc:picChg chg="add mod">
-          <ac:chgData name="Oscar Zamora Picazo" userId="4354f4aa-d855-4c88-ab21-c4609db47b84" providerId="ADAL" clId="{FB364DB0-0103-4D2F-BFDA-4DCB6883C9A8}" dt="2025-10-02T12:56:11.649" v="874" actId="1076"/>
+        <pc:picChg chg="add del mod">
+          <ac:chgData name="Oscar Zamora Picazo" userId="4354f4aa-d855-4c88-ab21-c4609db47b84" providerId="ADAL" clId="{FB364DB0-0103-4D2F-BFDA-4DCB6883C9A8}" dt="2025-10-02T14:17:49.061" v="1071" actId="478"/>
           <ac:picMkLst>
             <pc:docMk/>
             <pc:sldMk cId="3438522871" sldId="267"/>
             <ac:picMk id="4" creationId="{BDEA7670-8AD4-E502-66F9-440986E21BC9}"/>
+          </ac:picMkLst>
+        </pc:picChg>
+        <pc:picChg chg="add mod modCrop">
+          <ac:chgData name="Oscar Zamora Picazo" userId="4354f4aa-d855-4c88-ab21-c4609db47b84" providerId="ADAL" clId="{FB364DB0-0103-4D2F-BFDA-4DCB6883C9A8}" dt="2025-10-02T14:35:36.458" v="1077" actId="1076"/>
+          <ac:picMkLst>
+            <pc:docMk/>
+            <pc:sldMk cId="3438522871" sldId="267"/>
+            <ac:picMk id="5" creationId="{F650AFFD-A86B-830F-1019-DB55B9C09A15}"/>
           </ac:picMkLst>
         </pc:picChg>
         <pc:picChg chg="add del mod">
@@ -9205,10 +9213,10 @@
       </p:sp>
       <p:pic>
         <p:nvPicPr>
-          <p:cNvPr id="4" name="Picture 3">
-            <a:extLst>
-              <a:ext uri="{FF2B5EF4-FFF2-40B4-BE49-F238E27FC236}">
-                <a16:creationId xmlns:a16="http://schemas.microsoft.com/office/drawing/2014/main" id="{BDEA7670-8AD4-E502-66F9-440986E21BC9}"/>
+          <p:cNvPr id="5" name="Picture 4">
+            <a:extLst>
+              <a:ext uri="{FF2B5EF4-FFF2-40B4-BE49-F238E27FC236}">
+                <a16:creationId xmlns:a16="http://schemas.microsoft.com/office/drawing/2014/main" id="{F650AFFD-A86B-830F-1019-DB55B9C09A15}"/>
               </a:ext>
             </a:extLst>
           </p:cNvPr>
@@ -9219,14 +9227,15 @@
         </p:nvPicPr>
         <p:blipFill>
           <a:blip r:embed="rId2"/>
+          <a:srcRect b="6127"/>
           <a:stretch>
             <a:fillRect/>
           </a:stretch>
         </p:blipFill>
         <p:spPr>
           <a:xfrm>
-            <a:off x="1577082" y="209050"/>
-            <a:ext cx="8322067" cy="3146697"/>
+            <a:off x="2763749" y="73655"/>
+            <a:ext cx="6236413" cy="3248866"/>
           </a:xfrm>
           <a:prstGeom prst="rect">
             <a:avLst/>

</xml_diff>